<commit_message>
Test comments in module02
</commit_message>
<xml_diff>
--- a/results/m02-slides-and-speaker-notes.pptx
+++ b/results/m02-slides-and-speaker-notes.pptx
@@ -26318,6 +26318,116 @@
         <p:txBody>
           <a:bodyPr/>
           <a:lstStyle/>
+          <a:p>
+            <a:pPr lvl="0" marL="0" indent="0">
+              <a:buNone/>
+            </a:pPr>
+            <a:r>
+              <a:rPr/>
+              <a:t>data</a:t>
+            </a:r>
+            <a:r>
+              <a:rPr/>
+              <a:t> </a:t>
+            </a:r>
+            <a:r>
+              <a:rPr/>
+              <a:t>intro.fat;</a:t>
+            </a:r>
+            <a:r>
+              <a:rPr/>
+              <a:t> </a:t>
+            </a:r>
+            <a:r>
+              <a:rPr/>
+              <a:t>infile</a:t>
+            </a:r>
+            <a:r>
+              <a:rPr/>
+              <a:t> </a:t>
+            </a:r>
+            <a:r>
+              <a:rPr/>
+              <a:t>fat;</a:t>
+            </a:r>
+            <a:r>
+              <a:rPr/>
+              <a:t> </a:t>
+            </a:r>
+            <a:r>
+              <a:rPr/>
+              <a:t>input</a:t>
+            </a:r>
+            <a:r>
+              <a:rPr/>
+              <a:t> </a:t>
+            </a:r>
+            <a:r>
+              <a:rPr/>
+              <a:t>case</a:t>
+            </a:r>
+            <a:r>
+              <a:rPr/>
+              <a:t> </a:t>
+            </a:r>
+            <a:r>
+              <a:rPr/>
+              <a:t>fat_b</a:t>
+            </a:r>
+            <a:r>
+              <a:rPr/>
+              <a:t> </a:t>
+            </a:r>
+            <a:r>
+              <a:rPr/>
+              <a:t>fat_s</a:t>
+            </a:r>
+            <a:r>
+              <a:rPr/>
+              <a:t> </a:t>
+            </a:r>
+            <a:r>
+              <a:rPr/>
+              <a:t>dens</a:t>
+            </a:r>
+            <a:r>
+              <a:rPr/>
+              <a:t> </a:t>
+            </a:r>
+            <a:r>
+              <a:rPr/>
+              <a:t>age</a:t>
+            </a:r>
+            <a:r>
+              <a:rPr/>
+              <a:t> </a:t>
+            </a:r>
+            <a:r>
+              <a:rPr/>
+              <a:t>wt</a:t>
+            </a:r>
+            <a:r>
+              <a:rPr/>
+              <a:t> </a:t>
+            </a:r>
+            <a:r>
+              <a:rPr/>
+              <a:t>ht</a:t>
+            </a:r>
+            <a:r>
+              <a:rPr/>
+              <a:t> </a:t>
+            </a:r>
+            <a:r>
+              <a:rPr/>
+              <a:t>bmi</a:t>
+            </a:r>
+          </a:p>
+          <a:p>
+            <a:pPr lvl="0" marL="0" indent="0">
+              <a:buNone/>
+            </a:pPr>
+          </a:p>
           <a:p>
             <a:pPr lvl="0" marL="0" indent="0">
               <a:buNone/>

</xml_diff>